<commit_message>
Corrected formatting error in Docker/ACS slides
</commit_message>
<xml_diff>
--- a/Content/Container Service/Azure Container Service.pptx
+++ b/Content/Container Service/Azure Container Service.pptx
@@ -12392,11 +12392,7 @@
           <a:p>
             <a:r>
               <a:rPr lang="en-US" dirty="0" smtClean="0"/>
-              <a:t>Azure </a:t>
-            </a:r>
-            <a:r>
-              <a:rPr lang="en-US" dirty="0" smtClean="0"/>
-              <a:t>Container Service</a:t>
+              <a:t>Azure Container Service</a:t>
             </a:r>
             <a:endParaRPr lang="en-US" dirty="0"/>
           </a:p>
@@ -12504,25 +12500,101 @@
         </p:nvSpPr>
         <p:spPr>
           <a:xfrm>
-            <a:off x="519249" y="1447799"/>
-            <a:ext cx="11151917" cy="1784719"/>
+            <a:off x="519249" y="1825624"/>
+            <a:ext cx="11151917" cy="1427699"/>
           </a:xfrm>
         </p:spPr>
         <p:txBody>
           <a:bodyPr/>
           <a:lstStyle/>
           <a:p>
-            <a:r>
-              <a:rPr lang="en-US" dirty="0" smtClean="0"/>
-              <a:t>Establish SSH tunnel to master load balancer</a:t>
-            </a:r>
-          </a:p>
-          <a:p>
-            <a:r>
-              <a:rPr lang="en-US" dirty="0" smtClean="0"/>
-              <a:t>Use port forwarding to forward local Docker commands to Docker daemon on master LB</a:t>
-            </a:r>
-            <a:endParaRPr lang="en-US" dirty="0"/>
+            <a:pPr marL="457200" indent="-457200">
+              <a:buFont typeface="Arial" panose="020B0604020202020204" pitchFamily="34" charset="0"/>
+              <a:buChar char="•"/>
+            </a:pPr>
+            <a:r>
+              <a:rPr lang="en-US" sz="3199" dirty="0">
+                <a:gradFill>
+                  <a:gsLst>
+                    <a:gs pos="0">
+                      <a:srgbClr val="595959"/>
+                    </a:gs>
+                    <a:gs pos="86000">
+                      <a:srgbClr val="595959"/>
+                    </a:gs>
+                  </a:gsLst>
+                  <a:lin ang="5400000" scaled="0"/>
+                </a:gradFill>
+              </a:rPr>
+              <a:t>Establish SSH </a:t>
+            </a:r>
+            <a:r>
+              <a:rPr lang="en-US" sz="3199" dirty="0">
+                <a:gradFill>
+                  <a:gsLst>
+                    <a:gs pos="0">
+                      <a:srgbClr val="595959"/>
+                    </a:gs>
+                    <a:gs pos="86000">
+                      <a:srgbClr val="595959"/>
+                    </a:gs>
+                  </a:gsLst>
+                  <a:lin ang="5400000" scaled="0"/>
+                </a:gradFill>
+              </a:rPr>
+              <a:t>tunnel to master load balancer</a:t>
+            </a:r>
+          </a:p>
+          <a:p>
+            <a:pPr marL="457200" indent="-457200">
+              <a:buFont typeface="Arial" panose="020B0604020202020204" pitchFamily="34" charset="0"/>
+              <a:buChar char="•"/>
+            </a:pPr>
+            <a:r>
+              <a:rPr lang="en-US" sz="3199" dirty="0">
+                <a:gradFill>
+                  <a:gsLst>
+                    <a:gs pos="0">
+                      <a:srgbClr val="595959"/>
+                    </a:gs>
+                    <a:gs pos="86000">
+                      <a:srgbClr val="595959"/>
+                    </a:gs>
+                  </a:gsLst>
+                  <a:lin ang="5400000" scaled="0"/>
+                </a:gradFill>
+              </a:rPr>
+              <a:t>Use port forwarding to forward local Docker commands to Docker daemon on master </a:t>
+            </a:r>
+            <a:r>
+              <a:rPr lang="en-US" sz="3199" dirty="0" smtClean="0">
+                <a:gradFill>
+                  <a:gsLst>
+                    <a:gs pos="0">
+                      <a:srgbClr val="595959"/>
+                    </a:gs>
+                    <a:gs pos="86000">
+                      <a:srgbClr val="595959"/>
+                    </a:gs>
+                  </a:gsLst>
+                  <a:lin ang="5400000" scaled="0"/>
+                </a:gradFill>
+              </a:rPr>
+              <a:t>load balancer</a:t>
+            </a:r>
+            <a:endParaRPr lang="en-US" sz="3199" dirty="0">
+              <a:gradFill>
+                <a:gsLst>
+                  <a:gs pos="0">
+                    <a:srgbClr val="595959"/>
+                  </a:gs>
+                  <a:gs pos="86000">
+                    <a:srgbClr val="595959"/>
+                  </a:gs>
+                </a:gsLst>
+                <a:lin ang="5400000" scaled="0"/>
+              </a:gradFill>
+            </a:endParaRPr>
           </a:p>
         </p:txBody>
       </p:sp>
@@ -13007,11 +13079,7 @@
           <a:p>
             <a:r>
               <a:rPr lang="en-US" dirty="0" smtClean="0"/>
-              <a:t>Using </a:t>
-            </a:r>
-            <a:r>
-              <a:rPr lang="en-US" dirty="0" smtClean="0"/>
-              <a:t>Azure Container Service</a:t>
+              <a:t>Using Azure Container Service</a:t>
             </a:r>
             <a:endParaRPr lang="en-US" dirty="0"/>
           </a:p>
@@ -13151,23 +13219,7 @@
           <a:p>
             <a:r>
               <a:rPr lang="en-US" dirty="0" smtClean="0"/>
-              <a:t>Smaller, less </a:t>
-            </a:r>
-            <a:r>
-              <a:rPr lang="en-US" dirty="0" smtClean="0"/>
-              <a:t>costly, </a:t>
-            </a:r>
-            <a:r>
-              <a:rPr lang="en-US" dirty="0" smtClean="0"/>
-              <a:t>faster to </a:t>
-            </a:r>
-            <a:r>
-              <a:rPr lang="en-US" dirty="0" smtClean="0"/>
-              <a:t>start, </a:t>
-            </a:r>
-            <a:r>
-              <a:rPr lang="en-US" dirty="0" smtClean="0"/>
-              <a:t>and self-contained</a:t>
+              <a:t>Smaller, less costly, faster to start, and self-contained</a:t>
             </a:r>
           </a:p>
           <a:p>
@@ -14362,15 +14414,7 @@
           <a:p>
             <a:r>
               <a:rPr lang="en-US" dirty="0" smtClean="0"/>
-              <a:t>Supported </a:t>
-            </a:r>
-            <a:r>
-              <a:rPr lang="en-US" dirty="0" smtClean="0"/>
-              <a:t>natively in </a:t>
-            </a:r>
-            <a:r>
-              <a:rPr lang="en-US" dirty="0" smtClean="0"/>
-              <a:t>Azure</a:t>
+              <a:t>Supported natively in Azure</a:t>
             </a:r>
             <a:endParaRPr lang="en-US" dirty="0"/>
           </a:p>
@@ -14569,11 +14613,7 @@
           <a:p>
             <a:r>
               <a:rPr lang="en-US" dirty="0" smtClean="0"/>
-              <a:t>Docker </a:t>
-            </a:r>
-            <a:r>
-              <a:rPr lang="en-US" dirty="0" smtClean="0"/>
-              <a:t>CLI</a:t>
+              <a:t>Docker CLI</a:t>
             </a:r>
             <a:endParaRPr lang="en-US" dirty="0"/>
           </a:p>
@@ -14604,23 +14644,7 @@
           <a:p>
             <a:r>
               <a:rPr lang="en-US" dirty="0" smtClean="0"/>
-              <a:t>CLI for </a:t>
-            </a:r>
-            <a:r>
-              <a:rPr lang="en-US" dirty="0" smtClean="0"/>
-              <a:t>Docker, available for Linux, OS X, and Windows (available separately or </a:t>
-            </a:r>
-            <a:r>
-              <a:rPr lang="en-US" dirty="0" smtClean="0"/>
-              <a:t>as part of</a:t>
-            </a:r>
-            <a:r>
-              <a:rPr lang="en-US" dirty="0" smtClean="0"/>
-              <a:t> Docker </a:t>
-            </a:r>
-            <a:r>
-              <a:rPr lang="en-US" dirty="0" smtClean="0"/>
-              <a:t>Toolbox)</a:t>
+              <a:t>CLI for Docker, available for Linux, OS X, and Windows (available separately or as part of Docker Toolbox)</a:t>
             </a:r>
             <a:endParaRPr lang="en-US" dirty="0"/>
           </a:p>
@@ -15249,29 +15273,7 @@
                   <a:lin ang="5400000" scaled="0"/>
                 </a:gradFill>
               </a:rPr>
-              <a:t>Pul</a:t>
-            </a:r>
-            <a:r>
-              <a:rPr lang="en-US" sz="2400" dirty="0" smtClean="0">
-                <a:gradFill>
-                  <a:gsLst>
-                    <a:gs pos="0">
-                      <a:srgbClr val="292929">
-                        <a:lumMod val="90000"/>
-                        <a:lumOff val="10000"/>
-                      </a:srgbClr>
-                    </a:gs>
-                    <a:gs pos="86000">
-                      <a:srgbClr val="292929">
-                        <a:lumMod val="90000"/>
-                        <a:lumOff val="10000"/>
-                      </a:srgbClr>
-                    </a:gs>
-                  </a:gsLst>
-                  <a:lin ang="5400000" scaled="0"/>
-                </a:gradFill>
-              </a:rPr>
-              <a:t>l "Ubuntu" image from Docker Hub or local registry</a:t>
+              <a:t>Pull "Ubuntu" image from Docker Hub or local registry</a:t>
             </a:r>
             <a:endParaRPr lang="en-US" sz="2400" dirty="0">
               <a:gradFill>
@@ -15948,21 +15950,13 @@
           <a:p>
             <a:r>
               <a:rPr lang="en-US" dirty="0" smtClean="0"/>
-              <a:t>Robust</a:t>
-            </a:r>
+              <a:t>Robust, ready-to-use Docker hosting environment</a:t>
+            </a:r>
+          </a:p>
+          <a:p>
             <a:r>
               <a:rPr lang="en-US" dirty="0" smtClean="0"/>
-              <a:t>, ready-to-use Docker hosting environment</a:t>
-            </a:r>
-          </a:p>
-          <a:p>
-            <a:r>
-              <a:rPr lang="en-US" dirty="0" smtClean="0"/>
-              <a:t>Open-source </a:t>
-            </a:r>
-            <a:r>
-              <a:rPr lang="en-US" dirty="0" smtClean="0"/>
-              <a:t>orchestration tools (DC/OS and Swarm)</a:t>
+              <a:t>Open-source orchestration tools (DC/OS and Swarm)</a:t>
             </a:r>
           </a:p>
         </p:txBody>

</xml_diff>

<commit_message>
Corrected typo in Docker/ACS slides
</commit_message>
<xml_diff>
--- a/Content/Container Service/Azure Container Service.pptx
+++ b/Content/Container Service/Azure Container Service.pptx
@@ -12526,23 +12526,7 @@
                   <a:lin ang="5400000" scaled="0"/>
                 </a:gradFill>
               </a:rPr>
-              <a:t>Establish SSH </a:t>
-            </a:r>
-            <a:r>
-              <a:rPr lang="en-US" sz="3199" dirty="0">
-                <a:gradFill>
-                  <a:gsLst>
-                    <a:gs pos="0">
-                      <a:srgbClr val="595959"/>
-                    </a:gs>
-                    <a:gs pos="86000">
-                      <a:srgbClr val="595959"/>
-                    </a:gs>
-                  </a:gsLst>
-                  <a:lin ang="5400000" scaled="0"/>
-                </a:gradFill>
-              </a:rPr>
-              <a:t>tunnel to master load balancer</a:t>
+              <a:t>Establish SSH tunnel to master load balancer</a:t>
             </a:r>
           </a:p>
           <a:p>
@@ -12662,7 +12646,14 @@
                 <a:latin typeface="Courier New" panose="02070309020205020404" pitchFamily="49" charset="0"/>
                 <a:cs typeface="Courier New" panose="02070309020205020404" pitchFamily="49" charset="0"/>
               </a:rPr>
-              <a:t> -p 2200 -L 22375:127.0.0.1.2375</a:t>
+              <a:t> -p 2200 -L </a:t>
+            </a:r>
+            <a:r>
+              <a:rPr lang="de-DE" sz="2800" b="1" dirty="0" smtClean="0">
+                <a:latin typeface="Courier New" panose="02070309020205020404" pitchFamily="49" charset="0"/>
+                <a:cs typeface="Courier New" panose="02070309020205020404" pitchFamily="49" charset="0"/>
+              </a:rPr>
+              <a:t>22375:127.0.0.1:2375</a:t>
             </a:r>
             <a:endParaRPr lang="en-US" sz="2800" b="1" dirty="0">
               <a:gradFill>

</xml_diff>

<commit_message>
Correct typo in ACS slide note
</commit_message>
<xml_diff>
--- a/Content/Container Service/Azure Container Service.pptx
+++ b/Content/Container Service/Azure Container Service.pptx
@@ -1474,7 +1474,31 @@
                 <a:ea typeface="+mn-ea"/>
                 <a:cs typeface="+mn-cs"/>
               </a:rPr>
-              <a:t> in a terminal window on OS X or Linux. (Windows user need to use a third-party SSH tool such as </a:t>
+              <a:t> in a terminal window on OS X or Linux. (Windows </a:t>
+            </a:r>
+            <a:r>
+              <a:rPr lang="en-US" sz="1200" b="0" i="0" kern="1200" baseline="0" dirty="0" smtClean="0">
+                <a:solidFill>
+                  <a:schemeClr val="tx1"/>
+                </a:solidFill>
+                <a:effectLst/>
+                <a:latin typeface="+mn-lt"/>
+                <a:ea typeface="+mn-ea"/>
+                <a:cs typeface="+mn-cs"/>
+              </a:rPr>
+              <a:t>users </a:t>
+            </a:r>
+            <a:r>
+              <a:rPr lang="en-US" sz="1200" b="0" i="0" kern="1200" baseline="0" dirty="0" smtClean="0">
+                <a:solidFill>
+                  <a:schemeClr val="tx1"/>
+                </a:solidFill>
+                <a:effectLst/>
+                <a:latin typeface="+mn-lt"/>
+                <a:ea typeface="+mn-ea"/>
+                <a:cs typeface="+mn-cs"/>
+              </a:rPr>
+              <a:t>need to use a third-party SSH tool such as </a:t>
             </a:r>
             <a:r>
               <a:rPr lang="en-US" sz="1200" b="0" i="0" kern="1200" baseline="0" dirty="0" err="1" smtClean="0">
@@ -12646,14 +12670,7 @@
                 <a:latin typeface="Courier New" panose="02070309020205020404" pitchFamily="49" charset="0"/>
                 <a:cs typeface="Courier New" panose="02070309020205020404" pitchFamily="49" charset="0"/>
               </a:rPr>
-              <a:t> -p 2200 -L </a:t>
-            </a:r>
-            <a:r>
-              <a:rPr lang="de-DE" sz="2800" b="1" dirty="0" smtClean="0">
-                <a:latin typeface="Courier New" panose="02070309020205020404" pitchFamily="49" charset="0"/>
-                <a:cs typeface="Courier New" panose="02070309020205020404" pitchFamily="49" charset="0"/>
-              </a:rPr>
-              <a:t>22375:127.0.0.1:2375</a:t>
+              <a:t> -p 2200 -L 22375:127.0.0.1:2375</a:t>
             </a:r>
             <a:endParaRPr lang="en-US" sz="2800" b="1" dirty="0">
               <a:gradFill>
@@ -15264,7 +15281,51 @@
                   <a:lin ang="5400000" scaled="0"/>
                 </a:gradFill>
               </a:rPr>
-              <a:t>Pull "Ubuntu" image from Docker Hub or local registry</a:t>
+              <a:t>Pull "</a:t>
+            </a:r>
+            <a:r>
+              <a:rPr lang="en-US" sz="2400" dirty="0" err="1" smtClean="0">
+                <a:gradFill>
+                  <a:gsLst>
+                    <a:gs pos="0">
+                      <a:srgbClr val="292929">
+                        <a:lumMod val="90000"/>
+                        <a:lumOff val="10000"/>
+                      </a:srgbClr>
+                    </a:gs>
+                    <a:gs pos="86000">
+                      <a:srgbClr val="292929">
+                        <a:lumMod val="90000"/>
+                        <a:lumOff val="10000"/>
+                      </a:srgbClr>
+                    </a:gs>
+                  </a:gsLst>
+                  <a:lin ang="5400000" scaled="0"/>
+                </a:gradFill>
+              </a:rPr>
+              <a:t>ubuntu</a:t>
+            </a:r>
+            <a:r>
+              <a:rPr lang="en-US" sz="2400" dirty="0" smtClean="0">
+                <a:gradFill>
+                  <a:gsLst>
+                    <a:gs pos="0">
+                      <a:srgbClr val="292929">
+                        <a:lumMod val="90000"/>
+                        <a:lumOff val="10000"/>
+                      </a:srgbClr>
+                    </a:gs>
+                    <a:gs pos="86000">
+                      <a:srgbClr val="292929">
+                        <a:lumMod val="90000"/>
+                        <a:lumOff val="10000"/>
+                      </a:srgbClr>
+                    </a:gs>
+                  </a:gsLst>
+                  <a:lin ang="5400000" scaled="0"/>
+                </a:gradFill>
+              </a:rPr>
+              <a:t>" image from Docker Hub or local registry</a:t>
             </a:r>
             <a:endParaRPr lang="en-US" sz="2400" dirty="0">
               <a:gradFill>

</xml_diff>